<commit_message>
Update multiple presentation files to enhance content and ensure consistency across the bootcamp materials.
</commit_message>
<xml_diff>
--- a/slides/topics/00_about_bootcamp.pptx
+++ b/slides/topics/00_about_bootcamp.pptx
@@ -1,6 +1,6 @@
 
 <file path=ppt/presentation.xml><?xml version="1.0" encoding="utf-8"?>
-<p:presentation xmlns:a="http://schemas.openxmlformats.org/drawingml/2006/main" xmlns:p="http://schemas.openxmlformats.org/presentationml/2006/main" xmlns:r="http://schemas.openxmlformats.org/officeDocument/2006/relationships" saveSubsetFonts="1">
+<p:presentation xmlns:a="http://schemas.openxmlformats.org/drawingml/2006/main" xmlns:r="http://schemas.openxmlformats.org/officeDocument/2006/relationships" xmlns:p="http://schemas.openxmlformats.org/presentationml/2006/main" saveSubsetFonts="1">
   <p:sldMasterIdLst>
     <p:sldMasterId id="2147483660" r:id="rId1"/>
   </p:sldMasterIdLst>
@@ -15,6 +15,7 @@
     <p:sldId id="263" r:id="rId9"/>
     <p:sldId id="264" r:id="rId10"/>
     <p:sldId id="265" r:id="rId11"/>
+    <p:sldId id="266" r:id="rId12"/>
   </p:sldIdLst>
   <p:sldSz cx="12192000" cy="6858000"/>
   <p:notesSz cx="6858000" cy="9144000"/>
@@ -22,8 +23,8 @@
     <a:defPPr>
       <a:defRPr lang="en-US"/>
     </a:defPPr>
-    <a:lvl1pPr algn="l" defTabSz="914400" eaLnBrk="1" hangingPunct="1" latinLnBrk="0" marL="0" rtl="0">
-      <a:defRPr kern="1200" sz="1800">
+    <a:lvl1pPr marL="0" algn="l" defTabSz="914400" rtl="0" eaLnBrk="1" latinLnBrk="0" hangingPunct="1">
+      <a:defRPr sz="1800" kern="1200">
         <a:solidFill>
           <a:schemeClr val="tx1"/>
         </a:solidFill>
@@ -32,8 +33,8 @@
         <a:cs typeface="+mn-cs"/>
       </a:defRPr>
     </a:lvl1pPr>
-    <a:lvl2pPr algn="l" defTabSz="914400" eaLnBrk="1" hangingPunct="1" latinLnBrk="0" marL="457200" rtl="0">
-      <a:defRPr kern="1200" sz="1800">
+    <a:lvl2pPr marL="457200" algn="l" defTabSz="914400" rtl="0" eaLnBrk="1" latinLnBrk="0" hangingPunct="1">
+      <a:defRPr sz="1800" kern="1200">
         <a:solidFill>
           <a:schemeClr val="tx1"/>
         </a:solidFill>
@@ -42,8 +43,8 @@
         <a:cs typeface="+mn-cs"/>
       </a:defRPr>
     </a:lvl2pPr>
-    <a:lvl3pPr algn="l" defTabSz="914400" eaLnBrk="1" hangingPunct="1" latinLnBrk="0" marL="914400" rtl="0">
-      <a:defRPr kern="1200" sz="1800">
+    <a:lvl3pPr marL="914400" algn="l" defTabSz="914400" rtl="0" eaLnBrk="1" latinLnBrk="0" hangingPunct="1">
+      <a:defRPr sz="1800" kern="1200">
         <a:solidFill>
           <a:schemeClr val="tx1"/>
         </a:solidFill>
@@ -52,8 +53,8 @@
         <a:cs typeface="+mn-cs"/>
       </a:defRPr>
     </a:lvl3pPr>
-    <a:lvl4pPr algn="l" defTabSz="914400" eaLnBrk="1" hangingPunct="1" latinLnBrk="0" marL="1371600" rtl="0">
-      <a:defRPr kern="1200" sz="1800">
+    <a:lvl4pPr marL="1371600" algn="l" defTabSz="914400" rtl="0" eaLnBrk="1" latinLnBrk="0" hangingPunct="1">
+      <a:defRPr sz="1800" kern="1200">
         <a:solidFill>
           <a:schemeClr val="tx1"/>
         </a:solidFill>
@@ -62,8 +63,8 @@
         <a:cs typeface="+mn-cs"/>
       </a:defRPr>
     </a:lvl4pPr>
-    <a:lvl5pPr algn="l" defTabSz="914400" eaLnBrk="1" hangingPunct="1" latinLnBrk="0" marL="1828800" rtl="0">
-      <a:defRPr kern="1200" sz="1800">
+    <a:lvl5pPr marL="1828800" algn="l" defTabSz="914400" rtl="0" eaLnBrk="1" latinLnBrk="0" hangingPunct="1">
+      <a:defRPr sz="1800" kern="1200">
         <a:solidFill>
           <a:schemeClr val="tx1"/>
         </a:solidFill>
@@ -72,8 +73,8 @@
         <a:cs typeface="+mn-cs"/>
       </a:defRPr>
     </a:lvl5pPr>
-    <a:lvl6pPr algn="l" defTabSz="914400" eaLnBrk="1" hangingPunct="1" latinLnBrk="0" marL="2286000" rtl="0">
-      <a:defRPr kern="1200" sz="1800">
+    <a:lvl6pPr marL="2286000" algn="l" defTabSz="914400" rtl="0" eaLnBrk="1" latinLnBrk="0" hangingPunct="1">
+      <a:defRPr sz="1800" kern="1200">
         <a:solidFill>
           <a:schemeClr val="tx1"/>
         </a:solidFill>
@@ -82,8 +83,8 @@
         <a:cs typeface="+mn-cs"/>
       </a:defRPr>
     </a:lvl6pPr>
-    <a:lvl7pPr algn="l" defTabSz="914400" eaLnBrk="1" hangingPunct="1" latinLnBrk="0" marL="2743200" rtl="0">
-      <a:defRPr kern="1200" sz="1800">
+    <a:lvl7pPr marL="2743200" algn="l" defTabSz="914400" rtl="0" eaLnBrk="1" latinLnBrk="0" hangingPunct="1">
+      <a:defRPr sz="1800" kern="1200">
         <a:solidFill>
           <a:schemeClr val="tx1"/>
         </a:solidFill>
@@ -92,8 +93,8 @@
         <a:cs typeface="+mn-cs"/>
       </a:defRPr>
     </a:lvl7pPr>
-    <a:lvl8pPr algn="l" defTabSz="914400" eaLnBrk="1" hangingPunct="1" latinLnBrk="0" marL="3200400" rtl="0">
-      <a:defRPr kern="1200" sz="1800">
+    <a:lvl8pPr marL="3200400" algn="l" defTabSz="914400" rtl="0" eaLnBrk="1" latinLnBrk="0" hangingPunct="1">
+      <a:defRPr sz="1800" kern="1200">
         <a:solidFill>
           <a:schemeClr val="tx1"/>
         </a:solidFill>
@@ -102,8 +103,8 @@
         <a:cs typeface="+mn-cs"/>
       </a:defRPr>
     </a:lvl8pPr>
-    <a:lvl9pPr algn="l" defTabSz="914400" eaLnBrk="1" hangingPunct="1" latinLnBrk="0" marL="3657600" rtl="0">
-      <a:defRPr kern="1200" sz="1800">
+    <a:lvl9pPr marL="3657600" algn="l" defTabSz="914400" rtl="0" eaLnBrk="1" latinLnBrk="0" hangingPunct="1">
+      <a:defRPr sz="1800" kern="1200">
         <a:solidFill>
           <a:schemeClr val="tx1"/>
         </a:solidFill>
@@ -113,6 +114,11 @@
       </a:defRPr>
     </a:lvl9pPr>
   </p:defaultTextStyle>
+  <p:extLst>
+    <p:ext uri="{EFAFB233-063F-42B5-8137-9DF3F51BA10A}">
+      <p15:sldGuideLst xmlns:p15="http://schemas.microsoft.com/office/powerpoint/2012/main"/>
+    </p:ext>
+  </p:extLst>
 </p:presentation>
 </file>
 
@@ -265,7 +271,7 @@
           <a:p>
             <a:fld id="{C570B161-8950-4543-98EC-9F2A6A717D4A}" type="datetimeFigureOut">
               <a:rPr lang="en-GB" smtClean="0"/>
-              <a:t>07/07/2025</a:t>
+              <a:t>08/07/2025</a:t>
             </a:fld>
             <a:endParaRPr lang="en-GB"/>
           </a:p>
@@ -465,7 +471,7 @@
           <a:p>
             <a:fld id="{C570B161-8950-4543-98EC-9F2A6A717D4A}" type="datetimeFigureOut">
               <a:rPr lang="en-GB" smtClean="0"/>
-              <a:t>07/07/2025</a:t>
+              <a:t>08/07/2025</a:t>
             </a:fld>
             <a:endParaRPr lang="en-GB"/>
           </a:p>
@@ -675,7 +681,7 @@
           <a:p>
             <a:fld id="{C570B161-8950-4543-98EC-9F2A6A717D4A}" type="datetimeFigureOut">
               <a:rPr lang="en-GB" smtClean="0"/>
-              <a:t>07/07/2025</a:t>
+              <a:t>08/07/2025</a:t>
             </a:fld>
             <a:endParaRPr lang="en-GB"/>
           </a:p>
@@ -875,7 +881,7 @@
           <a:p>
             <a:fld id="{C570B161-8950-4543-98EC-9F2A6A717D4A}" type="datetimeFigureOut">
               <a:rPr lang="en-GB" smtClean="0"/>
-              <a:t>07/07/2025</a:t>
+              <a:t>08/07/2025</a:t>
             </a:fld>
             <a:endParaRPr lang="en-GB"/>
           </a:p>
@@ -1151,7 +1157,7 @@
           <a:p>
             <a:fld id="{C570B161-8950-4543-98EC-9F2A6A717D4A}" type="datetimeFigureOut">
               <a:rPr lang="en-GB" smtClean="0"/>
-              <a:t>07/07/2025</a:t>
+              <a:t>08/07/2025</a:t>
             </a:fld>
             <a:endParaRPr lang="en-GB"/>
           </a:p>
@@ -1419,7 +1425,7 @@
           <a:p>
             <a:fld id="{C570B161-8950-4543-98EC-9F2A6A717D4A}" type="datetimeFigureOut">
               <a:rPr lang="en-GB" smtClean="0"/>
-              <a:t>07/07/2025</a:t>
+              <a:t>08/07/2025</a:t>
             </a:fld>
             <a:endParaRPr lang="en-GB"/>
           </a:p>
@@ -1834,7 +1840,7 @@
           <a:p>
             <a:fld id="{C570B161-8950-4543-98EC-9F2A6A717D4A}" type="datetimeFigureOut">
               <a:rPr lang="en-GB" smtClean="0"/>
-              <a:t>07/07/2025</a:t>
+              <a:t>08/07/2025</a:t>
             </a:fld>
             <a:endParaRPr lang="en-GB"/>
           </a:p>
@@ -1976,7 +1982,7 @@
           <a:p>
             <a:fld id="{C570B161-8950-4543-98EC-9F2A6A717D4A}" type="datetimeFigureOut">
               <a:rPr lang="en-GB" smtClean="0"/>
-              <a:t>07/07/2025</a:t>
+              <a:t>08/07/2025</a:t>
             </a:fld>
             <a:endParaRPr lang="en-GB"/>
           </a:p>
@@ -2089,7 +2095,7 @@
           <a:p>
             <a:fld id="{C570B161-8950-4543-98EC-9F2A6A717D4A}" type="datetimeFigureOut">
               <a:rPr lang="en-GB" smtClean="0"/>
-              <a:t>07/07/2025</a:t>
+              <a:t>08/07/2025</a:t>
             </a:fld>
             <a:endParaRPr lang="en-GB"/>
           </a:p>
@@ -2402,7 +2408,7 @@
           <a:p>
             <a:fld id="{C570B161-8950-4543-98EC-9F2A6A717D4A}" type="datetimeFigureOut">
               <a:rPr lang="en-GB" smtClean="0"/>
-              <a:t>07/07/2025</a:t>
+              <a:t>08/07/2025</a:t>
             </a:fld>
             <a:endParaRPr lang="en-GB"/>
           </a:p>
@@ -2695,7 +2701,7 @@
           <a:p>
             <a:fld id="{C570B161-8950-4543-98EC-9F2A6A717D4A}" type="datetimeFigureOut">
               <a:rPr lang="en-GB" smtClean="0"/>
-              <a:t>07/07/2025</a:t>
+              <a:t>08/07/2025</a:t>
             </a:fld>
             <a:endParaRPr lang="en-GB"/>
           </a:p>
@@ -2769,7 +2775,7 @@
 </file>
 
 <file path=ppt/slideMasters/slideMaster1.xml><?xml version="1.0" encoding="utf-8"?>
-<p:sldMaster xmlns:a="http://schemas.openxmlformats.org/drawingml/2006/main" xmlns:p="http://schemas.openxmlformats.org/presentationml/2006/main" xmlns:r="http://schemas.openxmlformats.org/officeDocument/2006/relationships">
+<p:sldMaster xmlns:a="http://schemas.openxmlformats.org/drawingml/2006/main" xmlns:r="http://schemas.openxmlformats.org/officeDocument/2006/relationships" xmlns:p="http://schemas.openxmlformats.org/presentationml/2006/main">
   <p:cSld>
     <p:bg>
       <p:bgPr>
@@ -2819,7 +2825,7 @@
           </a:prstGeom>
         </p:spPr>
         <p:txBody>
-          <a:bodyPr anchor="ctr" bIns="45720" lIns="91440" rIns="91440" rtlCol="0" tIns="45720" vert="horz">
+          <a:bodyPr vert="horz" lIns="91440" tIns="45720" rIns="91440" bIns="45720" rtlCol="0" anchor="ctr">
             <a:normAutofit/>
           </a:bodyPr>
           <a:lstStyle/>
@@ -2828,7 +2834,7 @@
               <a:rPr lang="en-US"/>
               <a:t>Click to edit Master title style</a:t>
             </a:r>
-            <a:endParaRPr dirty="0" lang="en-GB"/>
+            <a:endParaRPr lang="en-GB" dirty="0"/>
           </a:p>
         </p:txBody>
       </p:sp>
@@ -2845,7 +2851,7 @@
             <a:spLocks noGrp="1"/>
           </p:cNvSpPr>
           <p:nvPr>
-            <p:ph idx="1" type="body"/>
+            <p:ph type="body" idx="1"/>
           </p:nvPr>
         </p:nvSpPr>
         <p:spPr>
@@ -2858,7 +2864,7 @@
           </a:prstGeom>
         </p:spPr>
         <p:txBody>
-          <a:bodyPr bIns="45720" lIns="91440" rIns="91440" rtlCol="0" tIns="45720" vert="horz">
+          <a:bodyPr vert="horz" lIns="91440" tIns="45720" rIns="91440" bIns="45720" rtlCol="0">
             <a:normAutofit/>
           </a:bodyPr>
           <a:lstStyle/>
@@ -2913,7 +2919,7 @@
             <a:spLocks noGrp="1"/>
           </p:cNvSpPr>
           <p:nvPr>
-            <p:ph idx="2" sz="half" type="dt"/>
+            <p:ph type="dt" sz="half" idx="2"/>
           </p:nvPr>
         </p:nvSpPr>
         <p:spPr>
@@ -2926,7 +2932,7 @@
           </a:prstGeom>
         </p:spPr>
         <p:txBody>
-          <a:bodyPr anchor="ctr" bIns="45720" lIns="91440" rIns="91440" rtlCol="0" tIns="45720" vert="horz"/>
+          <a:bodyPr vert="horz" lIns="91440" tIns="45720" rIns="91440" bIns="45720" rtlCol="0" anchor="ctr"/>
           <a:lstStyle>
             <a:lvl1pPr algn="l">
               <a:defRPr sz="1200">
@@ -2941,7 +2947,7 @@
           <a:p>
             <a:fld id="{C570B161-8950-4543-98EC-9F2A6A717D4A}" type="datetimeFigureOut">
               <a:rPr lang="en-GB" smtClean="0"/>
-              <a:t>07/07/2025</a:t>
+              <a:t>08/07/2025</a:t>
             </a:fld>
             <a:endParaRPr lang="en-GB"/>
           </a:p>
@@ -2960,7 +2966,7 @@
             <a:spLocks noGrp="1"/>
           </p:cNvSpPr>
           <p:nvPr>
-            <p:ph idx="3" sz="quarter" type="ftr"/>
+            <p:ph type="ftr" sz="quarter" idx="3"/>
           </p:nvPr>
         </p:nvSpPr>
         <p:spPr>
@@ -2973,7 +2979,7 @@
           </a:prstGeom>
         </p:spPr>
         <p:txBody>
-          <a:bodyPr anchor="ctr" bIns="45720" lIns="91440" rIns="91440" rtlCol="0" tIns="45720" vert="horz"/>
+          <a:bodyPr vert="horz" lIns="91440" tIns="45720" rIns="91440" bIns="45720" rtlCol="0" anchor="ctr"/>
           <a:lstStyle>
             <a:lvl1pPr algn="ctr">
               <a:defRPr sz="1200">
@@ -3003,7 +3009,7 @@
             <a:spLocks noGrp="1"/>
           </p:cNvSpPr>
           <p:nvPr>
-            <p:ph idx="4" sz="quarter" type="sldNum"/>
+            <p:ph type="sldNum" sz="quarter" idx="4"/>
           </p:nvPr>
         </p:nvSpPr>
         <p:spPr>
@@ -3016,7 +3022,7 @@
           </a:prstGeom>
         </p:spPr>
         <p:txBody>
-          <a:bodyPr anchor="ctr" bIns="45720" lIns="91440" rIns="91440" rtlCol="0" tIns="45720" vert="horz"/>
+          <a:bodyPr vert="horz" lIns="91440" tIns="45720" rIns="91440" bIns="45720" rtlCol="0" anchor="ctr"/>
           <a:lstStyle>
             <a:lvl1pPr algn="r">
               <a:defRPr sz="1200">
@@ -3044,7 +3050,7 @@
       </p:ext>
     </p:extLst>
   </p:cSld>
-  <p:clrMap accent1="accent1" accent2="accent2" accent3="accent3" accent4="accent4" accent5="accent5" accent6="accent6" bg1="lt1" bg2="lt2" folHlink="folHlink" hlink="hlink" tx1="dk1" tx2="dk2"/>
+  <p:clrMap bg1="lt1" tx1="dk1" bg2="lt2" tx2="dk2" accent1="accent1" accent2="accent2" accent3="accent3" accent4="accent4" accent5="accent5" accent6="accent6" hlink="hlink" folHlink="folHlink"/>
   <p:sldLayoutIdLst>
     <p:sldLayoutId id="2147483661" r:id="rId1"/>
     <p:sldLayoutId id="2147483662" r:id="rId2"/>
@@ -3060,7 +3066,7 @@
   </p:sldLayoutIdLst>
   <p:txStyles>
     <p:titleStyle>
-      <a:lvl1pPr algn="l" defTabSz="914400" eaLnBrk="1" hangingPunct="1" latinLnBrk="0" rtl="0">
+      <a:lvl1pPr algn="l" defTabSz="914400" rtl="0" eaLnBrk="1" latinLnBrk="0" hangingPunct="1">
         <a:lnSpc>
           <a:spcPct val="90000"/>
         </a:lnSpc>
@@ -3068,7 +3074,7 @@
           <a:spcPct val="0"/>
         </a:spcBef>
         <a:buNone/>
-        <a:defRPr kern="1200" sz="4400">
+        <a:defRPr sz="4400" kern="1200">
           <a:solidFill>
             <a:schemeClr val="tx1"/>
           </a:solidFill>
@@ -3079,16 +3085,16 @@
       </a:lvl1pPr>
     </p:titleStyle>
     <p:bodyStyle>
-      <a:lvl1pPr algn="l" defTabSz="914400" eaLnBrk="1" hangingPunct="1" indent="-228600" latinLnBrk="0" marL="228600" rtl="0">
+      <a:lvl1pPr marL="228600" indent="-228600" algn="l" defTabSz="914400" rtl="0" eaLnBrk="1" latinLnBrk="0" hangingPunct="1">
         <a:lnSpc>
           <a:spcPct val="90000"/>
         </a:lnSpc>
         <a:spcBef>
           <a:spcPts val="1000"/>
         </a:spcBef>
-        <a:buFont charset="0" panose="020B0604020202020204" pitchFamily="34" typeface="Arial"/>
+        <a:buFont typeface="Arial" panose="020B0604020202020204" pitchFamily="34" charset="0"/>
         <a:buChar char="•"/>
-        <a:defRPr kern="1200" sz="2800">
+        <a:defRPr sz="2800" kern="1200">
           <a:solidFill>
             <a:schemeClr val="tx1"/>
           </a:solidFill>
@@ -3097,16 +3103,16 @@
           <a:cs typeface="+mn-cs"/>
         </a:defRPr>
       </a:lvl1pPr>
-      <a:lvl2pPr algn="l" defTabSz="914400" eaLnBrk="1" hangingPunct="1" indent="-228600" latinLnBrk="0" marL="685800" rtl="0">
+      <a:lvl2pPr marL="685800" indent="-228600" algn="l" defTabSz="914400" rtl="0" eaLnBrk="1" latinLnBrk="0" hangingPunct="1">
         <a:lnSpc>
           <a:spcPct val="90000"/>
         </a:lnSpc>
         <a:spcBef>
           <a:spcPts val="500"/>
         </a:spcBef>
-        <a:buFont charset="0" panose="020B0604020202020204" pitchFamily="34" typeface="Arial"/>
+        <a:buFont typeface="Arial" panose="020B0604020202020204" pitchFamily="34" charset="0"/>
         <a:buChar char="•"/>
-        <a:defRPr kern="1200" sz="2400">
+        <a:defRPr sz="2400" kern="1200">
           <a:solidFill>
             <a:schemeClr val="tx1"/>
           </a:solidFill>
@@ -3115,16 +3121,16 @@
           <a:cs typeface="+mn-cs"/>
         </a:defRPr>
       </a:lvl2pPr>
-      <a:lvl3pPr algn="l" defTabSz="914400" eaLnBrk="1" hangingPunct="1" indent="-228600" latinLnBrk="0" marL="1143000" rtl="0">
+      <a:lvl3pPr marL="1143000" indent="-228600" algn="l" defTabSz="914400" rtl="0" eaLnBrk="1" latinLnBrk="0" hangingPunct="1">
         <a:lnSpc>
           <a:spcPct val="90000"/>
         </a:lnSpc>
         <a:spcBef>
           <a:spcPts val="500"/>
         </a:spcBef>
-        <a:buFont charset="0" panose="020B0604020202020204" pitchFamily="34" typeface="Arial"/>
+        <a:buFont typeface="Arial" panose="020B0604020202020204" pitchFamily="34" charset="0"/>
         <a:buChar char="•"/>
-        <a:defRPr kern="1200" sz="2000">
+        <a:defRPr sz="2000" kern="1200">
           <a:solidFill>
             <a:schemeClr val="tx1"/>
           </a:solidFill>
@@ -3133,16 +3139,16 @@
           <a:cs typeface="+mn-cs"/>
         </a:defRPr>
       </a:lvl3pPr>
-      <a:lvl4pPr algn="l" defTabSz="914400" eaLnBrk="1" hangingPunct="1" indent="-228600" latinLnBrk="0" marL="1600200" rtl="0">
+      <a:lvl4pPr marL="1600200" indent="-228600" algn="l" defTabSz="914400" rtl="0" eaLnBrk="1" latinLnBrk="0" hangingPunct="1">
         <a:lnSpc>
           <a:spcPct val="90000"/>
         </a:lnSpc>
         <a:spcBef>
           <a:spcPts val="500"/>
         </a:spcBef>
-        <a:buFont charset="0" panose="020B0604020202020204" pitchFamily="34" typeface="Arial"/>
+        <a:buFont typeface="Arial" panose="020B0604020202020204" pitchFamily="34" charset="0"/>
         <a:buChar char="•"/>
-        <a:defRPr kern="1200" sz="1800">
+        <a:defRPr sz="1800" kern="1200">
           <a:solidFill>
             <a:schemeClr val="tx1"/>
           </a:solidFill>
@@ -3151,16 +3157,16 @@
           <a:cs typeface="+mn-cs"/>
         </a:defRPr>
       </a:lvl4pPr>
-      <a:lvl5pPr algn="l" defTabSz="914400" eaLnBrk="1" hangingPunct="1" indent="-228600" latinLnBrk="0" marL="2057400" rtl="0">
+      <a:lvl5pPr marL="2057400" indent="-228600" algn="l" defTabSz="914400" rtl="0" eaLnBrk="1" latinLnBrk="0" hangingPunct="1">
         <a:lnSpc>
           <a:spcPct val="90000"/>
         </a:lnSpc>
         <a:spcBef>
           <a:spcPts val="500"/>
         </a:spcBef>
-        <a:buFont charset="0" panose="020B0604020202020204" pitchFamily="34" typeface="Arial"/>
+        <a:buFont typeface="Arial" panose="020B0604020202020204" pitchFamily="34" charset="0"/>
         <a:buChar char="•"/>
-        <a:defRPr kern="1200" sz="1800">
+        <a:defRPr sz="1800" kern="1200">
           <a:solidFill>
             <a:schemeClr val="tx1"/>
           </a:solidFill>
@@ -3169,16 +3175,16 @@
           <a:cs typeface="+mn-cs"/>
         </a:defRPr>
       </a:lvl5pPr>
-      <a:lvl6pPr algn="l" defTabSz="914400" eaLnBrk="1" hangingPunct="1" indent="-228600" latinLnBrk="0" marL="2514600" rtl="0">
+      <a:lvl6pPr marL="2514600" indent="-228600" algn="l" defTabSz="914400" rtl="0" eaLnBrk="1" latinLnBrk="0" hangingPunct="1">
         <a:lnSpc>
           <a:spcPct val="90000"/>
         </a:lnSpc>
         <a:spcBef>
           <a:spcPts val="500"/>
         </a:spcBef>
-        <a:buFont charset="0" panose="020B0604020202020204" pitchFamily="34" typeface="Arial"/>
+        <a:buFont typeface="Arial" panose="020B0604020202020204" pitchFamily="34" charset="0"/>
         <a:buChar char="•"/>
-        <a:defRPr kern="1200" sz="1800">
+        <a:defRPr sz="1800" kern="1200">
           <a:solidFill>
             <a:schemeClr val="tx1"/>
           </a:solidFill>
@@ -3187,16 +3193,16 @@
           <a:cs typeface="+mn-cs"/>
         </a:defRPr>
       </a:lvl6pPr>
-      <a:lvl7pPr algn="l" defTabSz="914400" eaLnBrk="1" hangingPunct="1" indent="-228600" latinLnBrk="0" marL="2971800" rtl="0">
+      <a:lvl7pPr marL="2971800" indent="-228600" algn="l" defTabSz="914400" rtl="0" eaLnBrk="1" latinLnBrk="0" hangingPunct="1">
         <a:lnSpc>
           <a:spcPct val="90000"/>
         </a:lnSpc>
         <a:spcBef>
           <a:spcPts val="500"/>
         </a:spcBef>
-        <a:buFont charset="0" panose="020B0604020202020204" pitchFamily="34" typeface="Arial"/>
+        <a:buFont typeface="Arial" panose="020B0604020202020204" pitchFamily="34" charset="0"/>
         <a:buChar char="•"/>
-        <a:defRPr kern="1200" sz="1800">
+        <a:defRPr sz="1800" kern="1200">
           <a:solidFill>
             <a:schemeClr val="tx1"/>
           </a:solidFill>
@@ -3205,16 +3211,16 @@
           <a:cs typeface="+mn-cs"/>
         </a:defRPr>
       </a:lvl7pPr>
-      <a:lvl8pPr algn="l" defTabSz="914400" eaLnBrk="1" hangingPunct="1" indent="-228600" latinLnBrk="0" marL="3429000" rtl="0">
+      <a:lvl8pPr marL="3429000" indent="-228600" algn="l" defTabSz="914400" rtl="0" eaLnBrk="1" latinLnBrk="0" hangingPunct="1">
         <a:lnSpc>
           <a:spcPct val="90000"/>
         </a:lnSpc>
         <a:spcBef>
           <a:spcPts val="500"/>
         </a:spcBef>
-        <a:buFont charset="0" panose="020B0604020202020204" pitchFamily="34" typeface="Arial"/>
+        <a:buFont typeface="Arial" panose="020B0604020202020204" pitchFamily="34" charset="0"/>
         <a:buChar char="•"/>
-        <a:defRPr kern="1200" sz="1800">
+        <a:defRPr sz="1800" kern="1200">
           <a:solidFill>
             <a:schemeClr val="tx1"/>
           </a:solidFill>
@@ -3223,16 +3229,16 @@
           <a:cs typeface="+mn-cs"/>
         </a:defRPr>
       </a:lvl8pPr>
-      <a:lvl9pPr algn="l" defTabSz="914400" eaLnBrk="1" hangingPunct="1" indent="-228600" latinLnBrk="0" marL="3886200" rtl="0">
+      <a:lvl9pPr marL="3886200" indent="-228600" algn="l" defTabSz="914400" rtl="0" eaLnBrk="1" latinLnBrk="0" hangingPunct="1">
         <a:lnSpc>
           <a:spcPct val="90000"/>
         </a:lnSpc>
         <a:spcBef>
           <a:spcPts val="500"/>
         </a:spcBef>
-        <a:buFont charset="0" panose="020B0604020202020204" pitchFamily="34" typeface="Arial"/>
+        <a:buFont typeface="Arial" panose="020B0604020202020204" pitchFamily="34" charset="0"/>
         <a:buChar char="•"/>
-        <a:defRPr kern="1200" sz="1800">
+        <a:defRPr sz="1800" kern="1200">
           <a:solidFill>
             <a:schemeClr val="tx1"/>
           </a:solidFill>
@@ -3246,8 +3252,8 @@
       <a:defPPr>
         <a:defRPr lang="en-US"/>
       </a:defPPr>
-      <a:lvl1pPr algn="l" defTabSz="914400" eaLnBrk="1" hangingPunct="1" latinLnBrk="0" marL="0" rtl="0">
-        <a:defRPr kern="1200" sz="1800">
+      <a:lvl1pPr marL="0" algn="l" defTabSz="914400" rtl="0" eaLnBrk="1" latinLnBrk="0" hangingPunct="1">
+        <a:defRPr sz="1800" kern="1200">
           <a:solidFill>
             <a:schemeClr val="tx1"/>
           </a:solidFill>
@@ -3256,8 +3262,8 @@
           <a:cs typeface="+mn-cs"/>
         </a:defRPr>
       </a:lvl1pPr>
-      <a:lvl2pPr algn="l" defTabSz="914400" eaLnBrk="1" hangingPunct="1" latinLnBrk="0" marL="457200" rtl="0">
-        <a:defRPr kern="1200" sz="1800">
+      <a:lvl2pPr marL="457200" algn="l" defTabSz="914400" rtl="0" eaLnBrk="1" latinLnBrk="0" hangingPunct="1">
+        <a:defRPr sz="1800" kern="1200">
           <a:solidFill>
             <a:schemeClr val="tx1"/>
           </a:solidFill>
@@ -3266,8 +3272,8 @@
           <a:cs typeface="+mn-cs"/>
         </a:defRPr>
       </a:lvl2pPr>
-      <a:lvl3pPr algn="l" defTabSz="914400" eaLnBrk="1" hangingPunct="1" latinLnBrk="0" marL="914400" rtl="0">
-        <a:defRPr kern="1200" sz="1800">
+      <a:lvl3pPr marL="914400" algn="l" defTabSz="914400" rtl="0" eaLnBrk="1" latinLnBrk="0" hangingPunct="1">
+        <a:defRPr sz="1800" kern="1200">
           <a:solidFill>
             <a:schemeClr val="tx1"/>
           </a:solidFill>
@@ -3276,8 +3282,8 @@
           <a:cs typeface="+mn-cs"/>
         </a:defRPr>
       </a:lvl3pPr>
-      <a:lvl4pPr algn="l" defTabSz="914400" eaLnBrk="1" hangingPunct="1" latinLnBrk="0" marL="1371600" rtl="0">
-        <a:defRPr kern="1200" sz="1800">
+      <a:lvl4pPr marL="1371600" algn="l" defTabSz="914400" rtl="0" eaLnBrk="1" latinLnBrk="0" hangingPunct="1">
+        <a:defRPr sz="1800" kern="1200">
           <a:solidFill>
             <a:schemeClr val="tx1"/>
           </a:solidFill>
@@ -3286,8 +3292,8 @@
           <a:cs typeface="+mn-cs"/>
         </a:defRPr>
       </a:lvl4pPr>
-      <a:lvl5pPr algn="l" defTabSz="914400" eaLnBrk="1" hangingPunct="1" latinLnBrk="0" marL="1828800" rtl="0">
-        <a:defRPr kern="1200" sz="1800">
+      <a:lvl5pPr marL="1828800" algn="l" defTabSz="914400" rtl="0" eaLnBrk="1" latinLnBrk="0" hangingPunct="1">
+        <a:defRPr sz="1800" kern="1200">
           <a:solidFill>
             <a:schemeClr val="tx1"/>
           </a:solidFill>
@@ -3296,8 +3302,8 @@
           <a:cs typeface="+mn-cs"/>
         </a:defRPr>
       </a:lvl5pPr>
-      <a:lvl6pPr algn="l" defTabSz="914400" eaLnBrk="1" hangingPunct="1" latinLnBrk="0" marL="2286000" rtl="0">
-        <a:defRPr kern="1200" sz="1800">
+      <a:lvl6pPr marL="2286000" algn="l" defTabSz="914400" rtl="0" eaLnBrk="1" latinLnBrk="0" hangingPunct="1">
+        <a:defRPr sz="1800" kern="1200">
           <a:solidFill>
             <a:schemeClr val="tx1"/>
           </a:solidFill>
@@ -3306,8 +3312,8 @@
           <a:cs typeface="+mn-cs"/>
         </a:defRPr>
       </a:lvl6pPr>
-      <a:lvl7pPr algn="l" defTabSz="914400" eaLnBrk="1" hangingPunct="1" latinLnBrk="0" marL="2743200" rtl="0">
-        <a:defRPr kern="1200" sz="1800">
+      <a:lvl7pPr marL="2743200" algn="l" defTabSz="914400" rtl="0" eaLnBrk="1" latinLnBrk="0" hangingPunct="1">
+        <a:defRPr sz="1800" kern="1200">
           <a:solidFill>
             <a:schemeClr val="tx1"/>
           </a:solidFill>
@@ -3316,8 +3322,8 @@
           <a:cs typeface="+mn-cs"/>
         </a:defRPr>
       </a:lvl7pPr>
-      <a:lvl8pPr algn="l" defTabSz="914400" eaLnBrk="1" hangingPunct="1" latinLnBrk="0" marL="3200400" rtl="0">
-        <a:defRPr kern="1200" sz="1800">
+      <a:lvl8pPr marL="3200400" algn="l" defTabSz="914400" rtl="0" eaLnBrk="1" latinLnBrk="0" hangingPunct="1">
+        <a:defRPr sz="1800" kern="1200">
           <a:solidFill>
             <a:schemeClr val="tx1"/>
           </a:solidFill>
@@ -3326,8 +3332,8 @@
           <a:cs typeface="+mn-cs"/>
         </a:defRPr>
       </a:lvl8pPr>
-      <a:lvl9pPr algn="l" defTabSz="914400" eaLnBrk="1" hangingPunct="1" latinLnBrk="0" marL="3657600" rtl="0">
-        <a:defRPr kern="1200" sz="1800">
+      <a:lvl9pPr marL="3657600" algn="l" defTabSz="914400" rtl="0" eaLnBrk="1" latinLnBrk="0" hangingPunct="1">
+        <a:defRPr sz="1800" kern="1200">
           <a:solidFill>
             <a:schemeClr val="tx1"/>
           </a:solidFill>
@@ -3384,18 +3390,150 @@
           <a:bodyPr/>
           <a:lstStyle/>
           <a:p>
-            <a:pPr lvl="0" indent="0" marL="0">
+            <a:pPr marL="0" lvl="0" indent="0">
               <a:buNone/>
             </a:pPr>
             <a:r>
-              <a:rPr/>
+              <a:rPr dirty="0"/>
               <a:t>About the Bootcamp</a:t>
+            </a:r>
+          </a:p>
+        </p:txBody>
+      </p:sp>
+      <p:pic>
+        <p:nvPicPr>
+          <p:cNvPr id="1026" name="Picture 2">
+            <a:extLst>
+              <a:ext uri="{FF2B5EF4-FFF2-40B4-BE49-F238E27FC236}">
+                <a16:creationId xmlns:a16="http://schemas.microsoft.com/office/drawing/2014/main" id="{676B6369-DD66-4592-6008-85E936077B39}"/>
+              </a:ext>
+            </a:extLst>
+          </p:cNvPr>
+          <p:cNvPicPr>
+            <a:picLocks noChangeAspect="1" noChangeArrowheads="1"/>
+          </p:cNvPicPr>
+          <p:nvPr/>
+        </p:nvPicPr>
+        <p:blipFill>
+          <a:blip r:embed="rId2">
+            <a:extLst>
+              <a:ext uri="{28A0092B-C50C-407E-A947-70E740481C1C}">
+                <a14:useLocalDpi xmlns:a14="http://schemas.microsoft.com/office/drawing/2010/main" val="0"/>
+              </a:ext>
+            </a:extLst>
+          </a:blip>
+          <a:srcRect/>
+          <a:stretch>
+            <a:fillRect/>
+          </a:stretch>
+        </p:blipFill>
+        <p:spPr bwMode="auto">
+          <a:xfrm>
+            <a:off x="8123723" y="238575"/>
+            <a:ext cx="3554431" cy="3240000"/>
+          </a:xfrm>
+          <a:prstGeom prst="rect">
+            <a:avLst/>
+          </a:prstGeom>
+          <a:noFill/>
+          <a:extLst>
+            <a:ext uri="{909E8E84-426E-40DD-AFC4-6F175D3DCCD1}">
+              <a14:hiddenFill xmlns:a14="http://schemas.microsoft.com/office/drawing/2010/main">
+                <a:solidFill>
+                  <a:srgbClr val="FFFFFF"/>
+                </a:solidFill>
+              </a14:hiddenFill>
+            </a:ext>
+          </a:extLst>
+        </p:spPr>
+      </p:pic>
+      <p:pic>
+        <p:nvPicPr>
+          <p:cNvPr id="1028" name="Picture 4" descr="Data Science Toolkit">
+            <a:extLst>
+              <a:ext uri="{FF2B5EF4-FFF2-40B4-BE49-F238E27FC236}">
+                <a16:creationId xmlns:a16="http://schemas.microsoft.com/office/drawing/2014/main" id="{A78F4B19-7AFA-1805-2D9E-8066A82FBE1D}"/>
+              </a:ext>
+            </a:extLst>
+          </p:cNvPr>
+          <p:cNvPicPr>
+            <a:picLocks noChangeAspect="1" noChangeArrowheads="1"/>
+          </p:cNvPicPr>
+          <p:nvPr/>
+        </p:nvPicPr>
+        <p:blipFill>
+          <a:blip r:embed="rId3">
+            <a:extLst>
+              <a:ext uri="{28A0092B-C50C-407E-A947-70E740481C1C}">
+                <a14:useLocalDpi xmlns:a14="http://schemas.microsoft.com/office/drawing/2010/main" val="0"/>
+              </a:ext>
+            </a:extLst>
+          </a:blip>
+          <a:srcRect/>
+          <a:stretch>
+            <a:fillRect/>
+          </a:stretch>
+        </p:blipFill>
+        <p:spPr bwMode="auto">
+          <a:xfrm>
+            <a:off x="513846" y="89738"/>
+            <a:ext cx="2797816" cy="3240000"/>
+          </a:xfrm>
+          <a:prstGeom prst="rect">
+            <a:avLst/>
+          </a:prstGeom>
+          <a:noFill/>
+          <a:extLst>
+            <a:ext uri="{909E8E84-426E-40DD-AFC4-6F175D3DCCD1}">
+              <a14:hiddenFill xmlns:a14="http://schemas.microsoft.com/office/drawing/2010/main">
+                <a:solidFill>
+                  <a:srgbClr val="FFFFFF"/>
+                </a:solidFill>
+              </a14:hiddenFill>
+            </a:ext>
+          </a:extLst>
+        </p:spPr>
+      </p:pic>
+      <p:sp>
+        <p:nvSpPr>
+          <p:cNvPr id="4" name="TextBox 3">
+            <a:extLst>
+              <a:ext uri="{FF2B5EF4-FFF2-40B4-BE49-F238E27FC236}">
+                <a16:creationId xmlns:a16="http://schemas.microsoft.com/office/drawing/2014/main" id="{AF32B89F-4CE6-3914-F267-BE0B47F725CC}"/>
+              </a:ext>
+            </a:extLst>
+          </p:cNvPr>
+          <p:cNvSpPr txBox="1"/>
+          <p:nvPr/>
+        </p:nvSpPr>
+        <p:spPr>
+          <a:xfrm>
+            <a:off x="3311662" y="832032"/>
+            <a:ext cx="4473432" cy="461665"/>
+          </a:xfrm>
+          <a:prstGeom prst="rect">
+            <a:avLst/>
+          </a:prstGeom>
+          <a:noFill/>
+        </p:spPr>
+        <p:txBody>
+          <a:bodyPr wrap="square">
+            <a:spAutoFit/>
+          </a:bodyPr>
+          <a:lstStyle/>
+          <a:p>
+            <a:r>
+              <a:rPr lang="en-GB" sz="2400" b="1" dirty="0"/>
+              <a:t>https://RStatsBootcamp.com/</a:t>
             </a:r>
           </a:p>
         </p:txBody>
       </p:sp>
     </p:spTree>
   </p:cSld>
+  <p:clrMapOvr>
+    <a:masterClrMapping/>
+  </p:clrMapOvr>
 </p:sld>
 </file>
 
@@ -3437,11 +3575,10 @@
           <a:bodyPr/>
           <a:lstStyle/>
           <a:p>
-            <a:pPr lvl="0" indent="0" marL="0">
+            <a:pPr marL="0" lvl="0" indent="0">
               <a:buNone/>
             </a:pPr>
             <a:r>
-              <a:rPr/>
               <a:t>Getting Support</a:t>
             </a:r>
           </a:p>
@@ -3463,42 +3600,152 @@
             <p:ph idx="1"/>
           </p:nvPr>
         </p:nvSpPr>
-        <p:spPr/>
-        <p:txBody>
-          <a:bodyPr/>
-          <a:lstStyle/>
-          <a:p>
-            <a:pPr lvl="0"/>
-            <a:r>
-              <a:rPr/>
+        <p:spPr>
+          <a:xfrm>
+            <a:off x="838200" y="1825625"/>
+            <a:ext cx="6919762" cy="4351338"/>
+          </a:xfrm>
+        </p:spPr>
+        <p:txBody>
+          <a:bodyPr/>
+          <a:lstStyle/>
+          <a:p>
+            <a:pPr lvl="0"/>
+            <a:r>
+              <a:rPr dirty="0"/>
               <a:t>Discord community support coming soon</a:t>
             </a:r>
           </a:p>
           <a:p>
             <a:pPr lvl="0"/>
             <a:r>
-              <a:rPr/>
+              <a:rPr dirty="0"/>
               <a:t>Additional resources linked throughout the course</a:t>
             </a:r>
           </a:p>
           <a:p>
             <a:pPr lvl="0"/>
             <a:r>
-              <a:rPr/>
+              <a:rPr dirty="0"/>
               <a:t>Self-assessment tools and practice exercises</a:t>
             </a:r>
           </a:p>
           <a:p>
             <a:pPr lvl="0"/>
             <a:r>
-              <a:rPr/>
+              <a:rPr dirty="0"/>
               <a:t>Learning-by-doing methodology with practical focus</a:t>
             </a:r>
           </a:p>
         </p:txBody>
       </p:sp>
+      <p:pic>
+        <p:nvPicPr>
+          <p:cNvPr id="5" name="Graphic 4">
+            <a:extLst>
+              <a:ext uri="{FF2B5EF4-FFF2-40B4-BE49-F238E27FC236}">
+                <a16:creationId xmlns:a16="http://schemas.microsoft.com/office/drawing/2014/main" id="{0B124DD9-728C-7008-71A0-250420956401}"/>
+              </a:ext>
+            </a:extLst>
+          </p:cNvPr>
+          <p:cNvPicPr>
+            <a:picLocks noChangeAspect="1"/>
+          </p:cNvPicPr>
+          <p:nvPr/>
+        </p:nvPicPr>
+        <p:blipFill>
+          <a:blip r:embed="rId2">
+            <a:extLst>
+              <a:ext uri="{96DAC541-7B7A-43D3-8B79-37D633B846F1}">
+                <asvg:svgBlip xmlns:asvg="http://schemas.microsoft.com/office/drawing/2016/SVG/main" r:embed="rId3"/>
+              </a:ext>
+            </a:extLst>
+          </a:blip>
+          <a:stretch>
+            <a:fillRect/>
+          </a:stretch>
+        </p:blipFill>
+        <p:spPr>
+          <a:xfrm>
+            <a:off x="8354727" y="3162323"/>
+            <a:ext cx="3527909" cy="533353"/>
+          </a:xfrm>
+          <a:prstGeom prst="rect">
+            <a:avLst/>
+          </a:prstGeom>
+        </p:spPr>
+      </p:pic>
     </p:spTree>
   </p:cSld>
+  <p:clrMapOvr>
+    <a:masterClrMapping/>
+  </p:clrMapOvr>
+</p:sld>
+</file>
+
+<file path=ppt/slides/slide11.xml><?xml version="1.0" encoding="utf-8"?>
+<p:sld xmlns:a="http://schemas.openxmlformats.org/drawingml/2006/main" xmlns:r="http://schemas.openxmlformats.org/officeDocument/2006/relationships" xmlns:p="http://schemas.openxmlformats.org/presentationml/2006/main">
+  <p:cSld>
+    <p:spTree>
+      <p:nvGrpSpPr>
+        <p:cNvPr id="1" name=""/>
+        <p:cNvGrpSpPr/>
+        <p:nvPr/>
+      </p:nvGrpSpPr>
+      <p:grpSpPr>
+        <a:xfrm>
+          <a:off x="0" y="0"/>
+          <a:ext cx="0" cy="0"/>
+          <a:chOff x="0" y="0"/>
+          <a:chExt cx="0" cy="0"/>
+        </a:xfrm>
+      </p:grpSpPr>
+      <p:pic>
+        <p:nvPicPr>
+          <p:cNvPr id="3" name="Picture 2" descr="A cat sitting on a computer&#10;&#10;AI-generated content may be incorrect.">
+            <a:extLst>
+              <a:ext uri="{FF2B5EF4-FFF2-40B4-BE49-F238E27FC236}">
+                <a16:creationId xmlns:a16="http://schemas.microsoft.com/office/drawing/2014/main" id="{5C5FCDE7-B554-35EB-CDBA-04822EFEF9C6}"/>
+              </a:ext>
+            </a:extLst>
+          </p:cNvPr>
+          <p:cNvPicPr>
+            <a:picLocks noChangeAspect="1"/>
+          </p:cNvPicPr>
+          <p:nvPr/>
+        </p:nvPicPr>
+        <p:blipFill>
+          <a:blip r:embed="rId2">
+            <a:extLst>
+              <a:ext uri="{28A0092B-C50C-407E-A947-70E740481C1C}">
+                <a14:useLocalDpi xmlns:a14="http://schemas.microsoft.com/office/drawing/2010/main" val="0"/>
+              </a:ext>
+            </a:extLst>
+          </a:blip>
+          <a:stretch>
+            <a:fillRect/>
+          </a:stretch>
+        </p:blipFill>
+        <p:spPr>
+          <a:xfrm>
+            <a:off x="2154453" y="702644"/>
+            <a:ext cx="7883093" cy="5255395"/>
+          </a:xfrm>
+          <a:prstGeom prst="rect">
+            <a:avLst/>
+          </a:prstGeom>
+        </p:spPr>
+      </p:pic>
+    </p:spTree>
+    <p:extLst>
+      <p:ext uri="{BB962C8B-B14F-4D97-AF65-F5344CB8AC3E}">
+        <p14:creationId xmlns:p14="http://schemas.microsoft.com/office/powerpoint/2010/main" val="1826081944"/>
+      </p:ext>
+    </p:extLst>
+  </p:cSld>
+  <p:clrMapOvr>
+    <a:masterClrMapping/>
+  </p:clrMapOvr>
 </p:sld>
 </file>
 
@@ -3540,11 +3787,10 @@
           <a:bodyPr/>
           <a:lstStyle/>
           <a:p>
-            <a:pPr lvl="0" indent="0" marL="0">
+            <a:pPr marL="0" lvl="0" indent="0">
               <a:buNone/>
             </a:pPr>
             <a:r>
-              <a:rPr/>
               <a:t>What is the R Stats Bootcamp?</a:t>
             </a:r>
           </a:p>
@@ -3566,42 +3812,122 @@
             <p:ph idx="1"/>
           </p:nvPr>
         </p:nvSpPr>
-        <p:spPr/>
-        <p:txBody>
-          <a:bodyPr/>
-          <a:lstStyle/>
-          <a:p>
-            <a:pPr lvl="0"/>
-            <a:r>
-              <a:rPr/>
+        <p:spPr>
+          <a:xfrm>
+            <a:off x="838200" y="1825625"/>
+            <a:ext cx="7449152" cy="4351338"/>
+          </a:xfrm>
+        </p:spPr>
+        <p:txBody>
+          <a:bodyPr/>
+          <a:lstStyle/>
+          <a:p>
+            <a:pPr lvl="0"/>
+            <a:r>
+              <a:rPr dirty="0"/>
               <a:t>Comprehensive, self-paced course for researchers and students</a:t>
             </a:r>
           </a:p>
           <a:p>
             <a:pPr lvl="0"/>
             <a:r>
-              <a:rPr/>
+              <a:rPr dirty="0"/>
               <a:t>Develops practical data science skills in R programming</a:t>
             </a:r>
           </a:p>
           <a:p>
             <a:pPr lvl="0"/>
             <a:r>
-              <a:rPr/>
+              <a:rPr dirty="0"/>
               <a:t>Focuses on statistical analysis and reproducible research practices</a:t>
             </a:r>
           </a:p>
           <a:p>
             <a:pPr lvl="0"/>
             <a:r>
-              <a:rPr/>
+              <a:rPr dirty="0"/>
               <a:t>Mission to provide accessible, high-quality training</a:t>
             </a:r>
           </a:p>
         </p:txBody>
       </p:sp>
+      <p:pic>
+        <p:nvPicPr>
+          <p:cNvPr id="5" name="Graphic 4">
+            <a:extLst>
+              <a:ext uri="{FF2B5EF4-FFF2-40B4-BE49-F238E27FC236}">
+                <a16:creationId xmlns:a16="http://schemas.microsoft.com/office/drawing/2014/main" id="{F4C195BB-00E2-8269-EF5E-76C24B21D725}"/>
+              </a:ext>
+            </a:extLst>
+          </p:cNvPr>
+          <p:cNvPicPr>
+            <a:picLocks noChangeAspect="1"/>
+          </p:cNvPicPr>
+          <p:nvPr/>
+        </p:nvPicPr>
+        <p:blipFill>
+          <a:blip r:embed="rId2">
+            <a:extLst>
+              <a:ext uri="{96DAC541-7B7A-43D3-8B79-37D633B846F1}">
+                <asvg:svgBlip xmlns:asvg="http://schemas.microsoft.com/office/drawing/2016/SVG/main" r:embed="rId3"/>
+              </a:ext>
+            </a:extLst>
+          </a:blip>
+          <a:stretch>
+            <a:fillRect/>
+          </a:stretch>
+        </p:blipFill>
+        <p:spPr>
+          <a:xfrm>
+            <a:off x="8155835" y="4539095"/>
+            <a:ext cx="3691824" cy="1295450"/>
+          </a:xfrm>
+          <a:prstGeom prst="rect">
+            <a:avLst/>
+          </a:prstGeom>
+        </p:spPr>
+      </p:pic>
+      <p:pic>
+        <p:nvPicPr>
+          <p:cNvPr id="7" name="Picture 6" descr="A blue and grey logo&#10;&#10;AI-generated content may be incorrect.">
+            <a:extLst>
+              <a:ext uri="{FF2B5EF4-FFF2-40B4-BE49-F238E27FC236}">
+                <a16:creationId xmlns:a16="http://schemas.microsoft.com/office/drawing/2014/main" id="{CF88FB5E-1934-7038-B57C-806A593C794B}"/>
+              </a:ext>
+            </a:extLst>
+          </p:cNvPr>
+          <p:cNvPicPr>
+            <a:picLocks noChangeAspect="1"/>
+          </p:cNvPicPr>
+          <p:nvPr/>
+        </p:nvPicPr>
+        <p:blipFill>
+          <a:blip r:embed="rId4">
+            <a:extLst>
+              <a:ext uri="{28A0092B-C50C-407E-A947-70E740481C1C}">
+                <a14:useLocalDpi xmlns:a14="http://schemas.microsoft.com/office/drawing/2010/main" val="0"/>
+              </a:ext>
+            </a:extLst>
+          </a:blip>
+          <a:stretch>
+            <a:fillRect/>
+          </a:stretch>
+        </p:blipFill>
+        <p:spPr>
+          <a:xfrm>
+            <a:off x="8630176" y="1690688"/>
+            <a:ext cx="2571296" cy="1992399"/>
+          </a:xfrm>
+          <a:prstGeom prst="rect">
+            <a:avLst/>
+          </a:prstGeom>
+        </p:spPr>
+      </p:pic>
     </p:spTree>
   </p:cSld>
+  <p:clrMapOvr>
+    <a:masterClrMapping/>
+  </p:clrMapOvr>
 </p:sld>
 </file>
 
@@ -3643,11 +3969,10 @@
           <a:bodyPr/>
           <a:lstStyle/>
           <a:p>
-            <a:pPr lvl="0" indent="0" marL="0">
+            <a:pPr marL="0" lvl="0" indent="0">
               <a:buNone/>
             </a:pPr>
             <a:r>
-              <a:rPr/>
               <a:t>Our Philosophy</a:t>
             </a:r>
           </a:p>
@@ -3676,35 +4001,47 @@
           <a:p>
             <a:pPr lvl="0"/>
             <a:r>
-              <a:rPr/>
+              <a:rPr dirty="0"/>
               <a:t>Accessible to researchers at all levels</a:t>
             </a:r>
           </a:p>
           <a:p>
             <a:pPr lvl="0"/>
             <a:r>
-              <a:rPr/>
+              <a:rPr dirty="0"/>
               <a:t>Practical with focus on real-world applications</a:t>
             </a:r>
           </a:p>
           <a:p>
             <a:pPr lvl="0"/>
             <a:r>
-              <a:rPr/>
+              <a:rPr dirty="0"/>
               <a:t>Reproducible to advance scientific integrity</a:t>
             </a:r>
           </a:p>
           <a:p>
             <a:pPr lvl="0"/>
             <a:r>
-              <a:rPr/>
+              <a:rPr dirty="0"/>
               <a:t>Collaborative to encourage knowledge sharing</a:t>
             </a:r>
+            <a:endParaRPr lang="en-GB" dirty="0"/>
+          </a:p>
+          <a:p>
+            <a:pPr lvl="0"/>
+            <a:r>
+              <a:rPr lang="en-GB" dirty="0"/>
+              <a:t>Free to promote open science</a:t>
+            </a:r>
+            <a:endParaRPr dirty="0"/>
           </a:p>
         </p:txBody>
       </p:sp>
     </p:spTree>
   </p:cSld>
+  <p:clrMapOvr>
+    <a:masterClrMapping/>
+  </p:clrMapOvr>
 </p:sld>
 </file>
 
@@ -3746,11 +4083,10 @@
           <a:bodyPr/>
           <a:lstStyle/>
           <a:p>
-            <a:pPr lvl="0" indent="0" marL="0">
+            <a:pPr marL="0" lvl="0" indent="0">
               <a:buNone/>
             </a:pPr>
             <a:r>
-              <a:rPr/>
               <a:t>Target Audience</a:t>
             </a:r>
           </a:p>
@@ -3779,28 +4115,24 @@
           <a:p>
             <a:pPr lvl="0"/>
             <a:r>
-              <a:rPr/>
               <a:t>Research students beginning their data analysis journey</a:t>
             </a:r>
           </a:p>
           <a:p>
             <a:pPr lvl="0"/>
             <a:r>
-              <a:rPr/>
               <a:t>Academic staff looking to update quantitative skills</a:t>
             </a:r>
           </a:p>
           <a:p>
             <a:pPr lvl="0"/>
             <a:r>
-              <a:rPr/>
               <a:t>Professionals transitioning to data-driven roles</a:t>
             </a:r>
           </a:p>
           <a:p>
             <a:pPr lvl="0"/>
             <a:r>
-              <a:rPr/>
               <a:t>Self-learners interested in R programming and statistics</a:t>
             </a:r>
           </a:p>
@@ -3808,6 +4140,9 @@
       </p:sp>
     </p:spTree>
   </p:cSld>
+  <p:clrMapOvr>
+    <a:masterClrMapping/>
+  </p:clrMapOvr>
 </p:sld>
 </file>
 
@@ -3849,11 +4184,10 @@
           <a:bodyPr/>
           <a:lstStyle/>
           <a:p>
-            <a:pPr lvl="0" indent="0" marL="0">
+            <a:pPr marL="0" lvl="0" indent="0">
               <a:buNone/>
             </a:pPr>
             <a:r>
-              <a:rPr/>
               <a:t>Module 1: R Foundations</a:t>
             </a:r>
           </a:p>
@@ -3882,28 +4216,24 @@
           <a:p>
             <a:pPr lvl="0"/>
             <a:r>
-              <a:rPr/>
               <a:t>Master fundamentals of R programming and RStudio environment</a:t>
             </a:r>
           </a:p>
           <a:p>
             <a:pPr lvl="0"/>
             <a:r>
-              <a:rPr/>
               <a:t>Learn to manipulate data and create functions</a:t>
             </a:r>
           </a:p>
           <a:p>
             <a:pPr lvl="0"/>
             <a:r>
-              <a:rPr/>
               <a:t>Work with different data structures</a:t>
             </a:r>
           </a:p>
           <a:p>
             <a:pPr lvl="0"/>
             <a:r>
-              <a:rPr/>
               <a:t>Build essential programming skills</a:t>
             </a:r>
           </a:p>
@@ -3911,6 +4241,9 @@
       </p:sp>
     </p:spTree>
   </p:cSld>
+  <p:clrMapOvr>
+    <a:masterClrMapping/>
+  </p:clrMapOvr>
 </p:sld>
 </file>
 
@@ -3952,11 +4285,10 @@
           <a:bodyPr/>
           <a:lstStyle/>
           <a:p>
-            <a:pPr lvl="0" indent="0" marL="0">
+            <a:pPr marL="0" lvl="0" indent="0">
               <a:buNone/>
             </a:pPr>
             <a:r>
-              <a:rPr/>
               <a:t>Module 2: Statistical Analysis</a:t>
             </a:r>
           </a:p>
@@ -3985,28 +4317,24 @@
           <a:p>
             <a:pPr lvl="0"/>
             <a:r>
-              <a:rPr/>
               <a:t>Apply R skills to statistical analysis and data visualization</a:t>
             </a:r>
           </a:p>
           <a:p>
             <a:pPr lvl="0"/>
             <a:r>
-              <a:rPr/>
               <a:t>Explore hypothesis testing, correlation, and regression</a:t>
             </a:r>
           </a:p>
           <a:p>
             <a:pPr lvl="0"/>
             <a:r>
-              <a:rPr/>
               <a:t>Learn techniques for data exploration and analysis</a:t>
             </a:r>
           </a:p>
           <a:p>
             <a:pPr lvl="0"/>
             <a:r>
-              <a:rPr/>
               <a:t>Master essential statistical concepts</a:t>
             </a:r>
           </a:p>
@@ -4014,6 +4342,9 @@
       </p:sp>
     </p:spTree>
   </p:cSld>
+  <p:clrMapOvr>
+    <a:masterClrMapping/>
+  </p:clrMapOvr>
 </p:sld>
 </file>
 
@@ -4055,11 +4386,10 @@
           <a:bodyPr/>
           <a:lstStyle/>
           <a:p>
-            <a:pPr lvl="0" indent="0" marL="0">
+            <a:pPr marL="0" lvl="0" indent="0">
               <a:buNone/>
             </a:pPr>
             <a:r>
-              <a:rPr/>
               <a:t>Module 3: Reproducible Research</a:t>
             </a:r>
           </a:p>
@@ -4088,28 +4418,24 @@
           <a:p>
             <a:pPr lvl="0"/>
             <a:r>
-              <a:rPr/>
               <a:t>Discover tools and practices for reproducible science</a:t>
             </a:r>
           </a:p>
           <a:p>
             <a:pPr lvl="0"/>
             <a:r>
-              <a:rPr/>
               <a:t>Learn R Markdown for dynamic documents</a:t>
             </a:r>
           </a:p>
           <a:p>
             <a:pPr lvl="0"/>
             <a:r>
-              <a:rPr/>
               <a:t>Master Git for version control</a:t>
             </a:r>
           </a:p>
           <a:p>
             <a:pPr lvl="0"/>
             <a:r>
-              <a:rPr/>
               <a:t>Develop collaborative workflow skills</a:t>
             </a:r>
           </a:p>
@@ -4117,6 +4443,9 @@
       </p:sp>
     </p:spTree>
   </p:cSld>
+  <p:clrMapOvr>
+    <a:masterClrMapping/>
+  </p:clrMapOvr>
 </p:sld>
 </file>
 
@@ -4158,11 +4487,10 @@
           <a:bodyPr/>
           <a:lstStyle/>
           <a:p>
-            <a:pPr lvl="0" indent="0" marL="0">
+            <a:pPr marL="0" lvl="0" indent="0">
               <a:buNone/>
             </a:pPr>
             <a:r>
-              <a:rPr/>
               <a:t>Learning Approach</a:t>
             </a:r>
           </a:p>
@@ -4191,28 +4519,24 @@
           <a:p>
             <a:pPr lvl="0"/>
             <a:r>
-              <a:rPr/>
               <a:t>Self-paced lessons that fit your schedule</a:t>
             </a:r>
           </a:p>
           <a:p>
             <a:pPr lvl="0"/>
             <a:r>
-              <a:rPr/>
               <a:t>Hands-on exercises to reinforce concepts</a:t>
             </a:r>
           </a:p>
           <a:p>
             <a:pPr lvl="0"/>
             <a:r>
-              <a:rPr/>
               <a:t>Real-world examples relevant to research contexts</a:t>
             </a:r>
           </a:p>
           <a:p>
             <a:pPr lvl="0"/>
             <a:r>
-              <a:rPr/>
               <a:t>Progressive difficulty building on previous knowledge</a:t>
             </a:r>
           </a:p>
@@ -4220,6 +4544,9 @@
       </p:sp>
     </p:spTree>
   </p:cSld>
+  <p:clrMapOvr>
+    <a:masterClrMapping/>
+  </p:clrMapOvr>
 </p:sld>
 </file>
 
@@ -4261,11 +4588,10 @@
           <a:bodyPr/>
           <a:lstStyle/>
           <a:p>
-            <a:pPr lvl="0" indent="0" marL="0">
+            <a:pPr marL="0" lvl="0" indent="0">
               <a:buNone/>
             </a:pPr>
             <a:r>
-              <a:rPr/>
               <a:t>Course Development</a:t>
             </a:r>
           </a:p>
@@ -4294,28 +4620,24 @@
           <a:p>
             <a:pPr lvl="0"/>
             <a:r>
-              <a:rPr/>
               <a:t>Based on current best practices in data science education</a:t>
             </a:r>
           </a:p>
           <a:p>
             <a:pPr lvl="0"/>
             <a:r>
-              <a:rPr/>
               <a:t>Incorporates feedback from learners and instructors</a:t>
             </a:r>
           </a:p>
           <a:p>
             <a:pPr lvl="0"/>
             <a:r>
-              <a:rPr/>
               <a:t>Reflects advances in R packages and statistical methods</a:t>
             </a:r>
           </a:p>
           <a:p>
             <a:pPr lvl="0"/>
             <a:r>
-              <a:rPr/>
               <a:t>Grounded in research on effective teaching and learning</a:t>
             </a:r>
           </a:p>
@@ -4323,6 +4645,9 @@
       </p:sp>
     </p:spTree>
   </p:cSld>
+  <p:clrMapOvr>
+    <a:masterClrMapping/>
+  </p:clrMapOvr>
 </p:sld>
 </file>
 
@@ -4639,265 +4964,4 @@
     </a:ext>
   </a:extLst>
 </a:theme>
-</file>
-
-<file path=ppt/theme/theme2.xml><?xml version="1.0" encoding="utf-8"?>
-<a:theme xmlns:a="http://schemas.openxmlformats.org/drawingml/2006/main" name="Office Theme">
-  <a:themeElements>
-    <a:clrScheme name="Office">
-      <a:dk1>
-        <a:sysClr val="windowText" lastClr="000000"/>
-      </a:dk1>
-      <a:lt1>
-        <a:sysClr val="window" lastClr="FFFFFF"/>
-      </a:lt1>
-      <a:dk2>
-        <a:srgbClr val="44546A"/>
-      </a:dk2>
-      <a:lt2>
-        <a:srgbClr val="E7E6E6"/>
-      </a:lt2>
-      <a:accent1>
-        <a:srgbClr val="5B9BD5"/>
-      </a:accent1>
-      <a:accent2>
-        <a:srgbClr val="ED7D31"/>
-      </a:accent2>
-      <a:accent3>
-        <a:srgbClr val="A5A5A5"/>
-      </a:accent3>
-      <a:accent4>
-        <a:srgbClr val="FFC000"/>
-      </a:accent4>
-      <a:accent5>
-        <a:srgbClr val="4472C4"/>
-      </a:accent5>
-      <a:accent6>
-        <a:srgbClr val="70AD47"/>
-      </a:accent6>
-      <a:hlink>
-        <a:srgbClr val="0563C1"/>
-      </a:hlink>
-      <a:folHlink>
-        <a:srgbClr val="954F72"/>
-      </a:folHlink>
-    </a:clrScheme>
-    <a:fontScheme name="Office">
-      <a:majorFont>
-        <a:latin typeface="Calibri Light" panose="020F0302020204030204"/>
-        <a:ea typeface=""/>
-        <a:cs typeface=""/>
-        <a:font script="Jpan" typeface="ＭＳ Ｐゴシック"/>
-        <a:font script="Hang" typeface="맑은 고딕"/>
-        <a:font script="Hans" typeface="宋体"/>
-        <a:font script="Hant" typeface="新細明體"/>
-        <a:font script="Arab" typeface="Times New Roman"/>
-        <a:font script="Hebr" typeface="Times New Roman"/>
-        <a:font script="Thai" typeface="Angsana New"/>
-        <a:font script="Ethi" typeface="Nyala"/>
-        <a:font script="Beng" typeface="Vrinda"/>
-        <a:font script="Gujr" typeface="Shruti"/>
-        <a:font script="Khmr" typeface="MoolBoran"/>
-        <a:font script="Knda" typeface="Tunga"/>
-        <a:font script="Guru" typeface="Raavi"/>
-        <a:font script="Cans" typeface="Euphemia"/>
-        <a:font script="Cher" typeface="Plantagenet Cherokee"/>
-        <a:font script="Yiii" typeface="Microsoft Yi Baiti"/>
-        <a:font script="Tibt" typeface="Microsoft Himalaya"/>
-        <a:font script="Thaa" typeface="MV Boli"/>
-        <a:font script="Deva" typeface="Mangal"/>
-        <a:font script="Telu" typeface="Gautami"/>
-        <a:font script="Taml" typeface="Latha"/>
-        <a:font script="Syrc" typeface="Estrangelo Edessa"/>
-        <a:font script="Orya" typeface="Kalinga"/>
-        <a:font script="Mlym" typeface="Kartika"/>
-        <a:font script="Laoo" typeface="DokChampa"/>
-        <a:font script="Sinh" typeface="Iskoola Pota"/>
-        <a:font script="Mong" typeface="Mongolian Baiti"/>
-        <a:font script="Viet" typeface="Times New Roman"/>
-        <a:font script="Uigh" typeface="Microsoft Uighur"/>
-        <a:font script="Geor" typeface="Sylfaen"/>
-      </a:majorFont>
-      <a:minorFont>
-        <a:latin typeface="Calibri" panose="020F0502020204030204"/>
-        <a:ea typeface=""/>
-        <a:cs typeface=""/>
-        <a:font script="Jpan" typeface="ＭＳ Ｐゴシック"/>
-        <a:font script="Hang" typeface="맑은 고딕"/>
-        <a:font script="Hans" typeface="宋体"/>
-        <a:font script="Hant" typeface="新細明體"/>
-        <a:font script="Arab" typeface="Arial"/>
-        <a:font script="Hebr" typeface="Arial"/>
-        <a:font script="Thai" typeface="Cordia New"/>
-        <a:font script="Ethi" typeface="Nyala"/>
-        <a:font script="Beng" typeface="Vrinda"/>
-        <a:font script="Gujr" typeface="Shruti"/>
-        <a:font script="Khmr" typeface="DaunPenh"/>
-        <a:font script="Knda" typeface="Tunga"/>
-        <a:font script="Guru" typeface="Raavi"/>
-        <a:font script="Cans" typeface="Euphemia"/>
-        <a:font script="Cher" typeface="Plantagenet Cherokee"/>
-        <a:font script="Yiii" typeface="Microsoft Yi Baiti"/>
-        <a:font script="Tibt" typeface="Microsoft Himalaya"/>
-        <a:font script="Thaa" typeface="MV Boli"/>
-        <a:font script="Deva" typeface="Mangal"/>
-        <a:font script="Telu" typeface="Gautami"/>
-        <a:font script="Taml" typeface="Latha"/>
-        <a:font script="Syrc" typeface="Estrangelo Edessa"/>
-        <a:font script="Orya" typeface="Kalinga"/>
-        <a:font script="Mlym" typeface="Kartika"/>
-        <a:font script="Laoo" typeface="DokChampa"/>
-        <a:font script="Sinh" typeface="Iskoola Pota"/>
-        <a:font script="Mong" typeface="Mongolian Baiti"/>
-        <a:font script="Viet" typeface="Arial"/>
-        <a:font script="Uigh" typeface="Microsoft Uighur"/>
-        <a:font script="Geor" typeface="Sylfaen"/>
-      </a:minorFont>
-    </a:fontScheme>
-    <a:fmtScheme name="Office">
-      <a:fillStyleLst>
-        <a:solidFill>
-          <a:schemeClr val="phClr"/>
-        </a:solidFill>
-        <a:gradFill rotWithShape="1">
-          <a:gsLst>
-            <a:gs pos="0">
-              <a:schemeClr val="phClr">
-                <a:lumMod val="110000"/>
-                <a:satMod val="105000"/>
-                <a:tint val="67000"/>
-              </a:schemeClr>
-            </a:gs>
-            <a:gs pos="50000">
-              <a:schemeClr val="phClr">
-                <a:lumMod val="105000"/>
-                <a:satMod val="103000"/>
-                <a:tint val="73000"/>
-              </a:schemeClr>
-            </a:gs>
-            <a:gs pos="100000">
-              <a:schemeClr val="phClr">
-                <a:lumMod val="105000"/>
-                <a:satMod val="109000"/>
-                <a:tint val="81000"/>
-              </a:schemeClr>
-            </a:gs>
-          </a:gsLst>
-          <a:lin ang="5400000" scaled="0"/>
-        </a:gradFill>
-        <a:gradFill rotWithShape="1">
-          <a:gsLst>
-            <a:gs pos="0">
-              <a:schemeClr val="phClr">
-                <a:satMod val="103000"/>
-                <a:lumMod val="102000"/>
-                <a:tint val="94000"/>
-              </a:schemeClr>
-            </a:gs>
-            <a:gs pos="50000">
-              <a:schemeClr val="phClr">
-                <a:satMod val="110000"/>
-                <a:lumMod val="100000"/>
-                <a:shade val="100000"/>
-              </a:schemeClr>
-            </a:gs>
-            <a:gs pos="100000">
-              <a:schemeClr val="phClr">
-                <a:lumMod val="99000"/>
-                <a:satMod val="120000"/>
-                <a:shade val="78000"/>
-              </a:schemeClr>
-            </a:gs>
-          </a:gsLst>
-          <a:lin ang="5400000" scaled="0"/>
-        </a:gradFill>
-      </a:fillStyleLst>
-      <a:lnStyleLst>
-        <a:ln w="6350" cap="flat" cmpd="sng" algn="ctr">
-          <a:solidFill>
-            <a:schemeClr val="phClr"/>
-          </a:solidFill>
-          <a:prstDash val="solid"/>
-          <a:miter lim="800000"/>
-        </a:ln>
-        <a:ln w="12700" cap="flat" cmpd="sng" algn="ctr">
-          <a:solidFill>
-            <a:schemeClr val="phClr"/>
-          </a:solidFill>
-          <a:prstDash val="solid"/>
-          <a:miter lim="800000"/>
-        </a:ln>
-        <a:ln w="19050" cap="flat" cmpd="sng" algn="ctr">
-          <a:solidFill>
-            <a:schemeClr val="phClr"/>
-          </a:solidFill>
-          <a:prstDash val="solid"/>
-          <a:miter lim="800000"/>
-        </a:ln>
-      </a:lnStyleLst>
-      <a:effectStyleLst>
-        <a:effectStyle>
-          <a:effectLst/>
-        </a:effectStyle>
-        <a:effectStyle>
-          <a:effectLst/>
-        </a:effectStyle>
-        <a:effectStyle>
-          <a:effectLst>
-            <a:outerShdw blurRad="57150" dist="19050" dir="5400000" algn="ctr" rotWithShape="0">
-              <a:srgbClr val="000000">
-                <a:alpha val="63000"/>
-              </a:srgbClr>
-            </a:outerShdw>
-          </a:effectLst>
-        </a:effectStyle>
-      </a:effectStyleLst>
-      <a:bgFillStyleLst>
-        <a:solidFill>
-          <a:schemeClr val="phClr"/>
-        </a:solidFill>
-        <a:solidFill>
-          <a:schemeClr val="phClr">
-            <a:tint val="95000"/>
-            <a:satMod val="170000"/>
-          </a:schemeClr>
-        </a:solidFill>
-        <a:gradFill rotWithShape="1">
-          <a:gsLst>
-            <a:gs pos="0">
-              <a:schemeClr val="phClr">
-                <a:tint val="93000"/>
-                <a:satMod val="150000"/>
-                <a:shade val="98000"/>
-                <a:lumMod val="102000"/>
-              </a:schemeClr>
-            </a:gs>
-            <a:gs pos="50000">
-              <a:schemeClr val="phClr">
-                <a:tint val="98000"/>
-                <a:satMod val="130000"/>
-                <a:shade val="90000"/>
-                <a:lumMod val="103000"/>
-              </a:schemeClr>
-            </a:gs>
-            <a:gs pos="100000">
-              <a:schemeClr val="phClr">
-                <a:shade val="63000"/>
-                <a:satMod val="120000"/>
-              </a:schemeClr>
-            </a:gs>
-          </a:gsLst>
-          <a:lin ang="5400000" scaled="0"/>
-        </a:gradFill>
-      </a:bgFillStyleLst>
-    </a:fmtScheme>
-  </a:themeElements>
-  <a:objectDefaults/>
-  <a:extraClrSchemeLst/>
-  <a:extLst>
-    <a:ext uri="{05A4C25C-085E-4340-85A3-A5531E510DB2}">
-      <thm15:themeFamily xmlns:thm15="http://schemas.microsoft.com/office/thememl/2012/main" name="Office Theme" id="{62F939B6-93AF-4DB8-9C6B-D6C7DFDC589F}" vid="{4A3C46E8-61CC-4603-A589-7422A47A8E4A}"/>
-    </a:ext>
-  </a:extLst>
-</a:theme>
 </file>
</xml_diff>